<commit_message>
changed site location.improved prezi.
</commit_message>
<xml_diff>
--- a/documentation/src/main/java/am.gitc.documentation/prezentation/Library.pptx
+++ b/documentation/src/main/java/am.gitc.documentation/prezentation/Library.pptx
@@ -14,8 +14,11 @@
     <p:sldId id="263" r:id="rId8"/>
     <p:sldId id="260" r:id="rId9"/>
     <p:sldId id="264" r:id="rId10"/>
-    <p:sldId id="265" r:id="rId11"/>
-    <p:sldId id="259" r:id="rId12"/>
+    <p:sldId id="267" r:id="rId11"/>
+    <p:sldId id="269" r:id="rId12"/>
+    <p:sldId id="268" r:id="rId13"/>
+    <p:sldId id="265" r:id="rId14"/>
+    <p:sldId id="259" r:id="rId15"/>
   </p:sldIdLst>
   <p:sldSz cx="12192000" cy="6858000"/>
   <p:notesSz cx="6858000" cy="9144000"/>
@@ -116,7 +119,7 @@
   </p:defaultTextStyle>
   <p:extLst>
     <p:ext uri="{EFAFB233-063F-42B5-8137-9DF3F51BA10A}">
-      <p15:sldGuideLst xmlns="" xmlns:p15="http://schemas.microsoft.com/office/powerpoint/2012/main"/>
+      <p15:sldGuideLst xmlns:p15="http://schemas.microsoft.com/office/powerpoint/2012/main" xmlns=""/>
     </p:ext>
   </p:extLst>
 </p:presentation>
@@ -403,7 +406,7 @@
             <a:fld id="{E18788B9-13DE-4D1E-938B-E8DD7C232845}" type="datetimeFigureOut">
               <a:rPr lang="en-US" smtClean="0"/>
               <a:pPr/>
-              <a:t>7/2/2016</a:t>
+              <a:t>7/3/2016</a:t>
             </a:fld>
             <a:endParaRPr lang="en-US"/>
           </a:p>
@@ -798,7 +801,7 @@
             <a:fld id="{E18788B9-13DE-4D1E-938B-E8DD7C232845}" type="datetimeFigureOut">
               <a:rPr lang="en-US" smtClean="0"/>
               <a:pPr/>
-              <a:t>7/2/2016</a:t>
+              <a:t>7/3/2016</a:t>
             </a:fld>
             <a:endParaRPr lang="en-US"/>
           </a:p>
@@ -1333,7 +1336,7 @@
             <a:fld id="{E18788B9-13DE-4D1E-938B-E8DD7C232845}" type="datetimeFigureOut">
               <a:rPr lang="en-US" smtClean="0"/>
               <a:pPr/>
-              <a:t>7/2/2016</a:t>
+              <a:t>7/3/2016</a:t>
             </a:fld>
             <a:endParaRPr lang="en-US"/>
           </a:p>
@@ -1467,7 +1470,7 @@
             <a:fld id="{E18788B9-13DE-4D1E-938B-E8DD7C232845}" type="datetimeFigureOut">
               <a:rPr lang="en-US" smtClean="0"/>
               <a:pPr/>
-              <a:t>7/2/2016</a:t>
+              <a:t>7/3/2016</a:t>
             </a:fld>
             <a:endParaRPr lang="en-US"/>
           </a:p>
@@ -2012,7 +2015,7 @@
             <a:fld id="{E18788B9-13DE-4D1E-938B-E8DD7C232845}" type="datetimeFigureOut">
               <a:rPr lang="en-US" smtClean="0"/>
               <a:pPr/>
-              <a:t>7/2/2016</a:t>
+              <a:t>7/3/2016</a:t>
             </a:fld>
             <a:endParaRPr lang="en-US"/>
           </a:p>
@@ -2309,7 +2312,7 @@
             <a:fld id="{E18788B9-13DE-4D1E-938B-E8DD7C232845}" type="datetimeFigureOut">
               <a:rPr lang="en-US" smtClean="0"/>
               <a:pPr/>
-              <a:t>7/2/2016</a:t>
+              <a:t>7/3/2016</a:t>
             </a:fld>
             <a:endParaRPr lang="en-US"/>
           </a:p>
@@ -2970,7 +2973,7 @@
             <a:fld id="{E18788B9-13DE-4D1E-938B-E8DD7C232845}" type="datetimeFigureOut">
               <a:rPr lang="en-US" smtClean="0"/>
               <a:pPr/>
-              <a:t>7/2/2016</a:t>
+              <a:t>7/3/2016</a:t>
             </a:fld>
             <a:endParaRPr lang="en-US"/>
           </a:p>
@@ -3408,7 +3411,7 @@
             <a:fld id="{E18788B9-13DE-4D1E-938B-E8DD7C232845}" type="datetimeFigureOut">
               <a:rPr lang="en-US" smtClean="0"/>
               <a:pPr/>
-              <a:t>7/2/2016</a:t>
+              <a:t>7/3/2016</a:t>
             </a:fld>
             <a:endParaRPr lang="en-US"/>
           </a:p>
@@ -3723,7 +3726,7 @@
             <a:fld id="{E18788B9-13DE-4D1E-938B-E8DD7C232845}" type="datetimeFigureOut">
               <a:rPr lang="en-US" smtClean="0"/>
               <a:pPr/>
-              <a:t>7/2/2016</a:t>
+              <a:t>7/3/2016</a:t>
             </a:fld>
             <a:endParaRPr lang="en-US"/>
           </a:p>
@@ -4458,7 +4461,7 @@
             <a:fld id="{E18788B9-13DE-4D1E-938B-E8DD7C232845}" type="datetimeFigureOut">
               <a:rPr lang="en-US" smtClean="0"/>
               <a:pPr/>
-              <a:t>7/2/2016</a:t>
+              <a:t>7/3/2016</a:t>
             </a:fld>
             <a:endParaRPr lang="en-US"/>
           </a:p>
@@ -5124,7 +5127,7 @@
             <a:fld id="{E18788B9-13DE-4D1E-938B-E8DD7C232845}" type="datetimeFigureOut">
               <a:rPr lang="en-US" smtClean="0"/>
               <a:pPr/>
-              <a:t>7/2/2016</a:t>
+              <a:t>7/3/2016</a:t>
             </a:fld>
             <a:endParaRPr lang="en-US"/>
           </a:p>
@@ -5398,7 +5401,7 @@
             <a:fld id="{E18788B9-13DE-4D1E-938B-E8DD7C232845}" type="datetimeFigureOut">
               <a:rPr lang="en-US" smtClean="0"/>
               <a:pPr/>
-              <a:t>7/2/2016</a:t>
+              <a:t>7/3/2016</a:t>
             </a:fld>
             <a:endParaRPr lang="en-US"/>
           </a:p>
@@ -6167,7 +6170,7 @@
     </p:spTree>
     <p:extLst>
       <p:ext uri="{BB962C8B-B14F-4D97-AF65-F5344CB8AC3E}">
-        <p14:creationId xmlns="" xmlns:p14="http://schemas.microsoft.com/office/powerpoint/2010/main" val="443230944"/>
+        <p14:creationId xmlns:p14="http://schemas.microsoft.com/office/powerpoint/2010/main" xmlns="" val="443230944"/>
       </p:ext>
     </p:extLst>
   </p:cSld>
@@ -6203,7 +6206,7 @@
       </p:grpSpPr>
       <p:sp>
         <p:nvSpPr>
-          <p:cNvPr id="3" name="Subtitle 2"/>
+          <p:cNvPr id="5" name="Подзаголовок 4"/>
           <p:cNvSpPr>
             <a:spLocks noGrp="1"/>
           </p:cNvSpPr>
@@ -6211,88 +6214,12 @@
             <p:ph type="subTitle" idx="1"/>
           </p:nvPr>
         </p:nvSpPr>
-        <p:spPr>
-          <a:xfrm>
-            <a:off x="1742968" y="3119564"/>
-            <a:ext cx="8825658" cy="2046500"/>
-          </a:xfrm>
-        </p:spPr>
+        <p:spPr/>
         <p:txBody>
           <a:bodyPr/>
           <a:lstStyle/>
           <a:p>
-            <a:r>
-              <a:rPr lang="en-US" dirty="0" smtClean="0"/>
-              <a:t>Book rating</a:t>
-            </a:r>
-          </a:p>
-          <a:p>
-            <a:r>
-              <a:rPr lang="en-US" dirty="0"/>
-              <a:t>Teaching video library</a:t>
-            </a:r>
-          </a:p>
-          <a:p>
-            <a:r>
-              <a:rPr lang="en-US" dirty="0" err="1" smtClean="0"/>
-              <a:t>Chating</a:t>
-            </a:r>
-            <a:endParaRPr lang="en-US" dirty="0" smtClean="0"/>
-          </a:p>
-          <a:p>
-            <a:r>
-              <a:rPr lang="en-US" dirty="0" err="1" smtClean="0"/>
-              <a:t>jenkins</a:t>
-            </a:r>
-            <a:r>
-              <a:rPr lang="en-US" dirty="0" smtClean="0"/>
-              <a:t> </a:t>
-            </a:r>
-            <a:r>
-              <a:rPr lang="en-US" dirty="0" smtClean="0"/>
-              <a:t>integration</a:t>
-            </a:r>
-            <a:endParaRPr lang="en-US" dirty="0" smtClean="0"/>
-          </a:p>
-          <a:p>
-            <a:endParaRPr lang="en-US" dirty="0" smtClean="0"/>
-          </a:p>
-          <a:p>
-            <a:endParaRPr lang="en-US" dirty="0" smtClean="0"/>
-          </a:p>
-          <a:p>
-            <a:endParaRPr lang="en-US" dirty="0"/>
-          </a:p>
-        </p:txBody>
-      </p:sp>
-      <p:sp>
-        <p:nvSpPr>
-          <p:cNvPr id="2" name="Title 1"/>
-          <p:cNvSpPr>
-            <a:spLocks noGrp="1"/>
-          </p:cNvSpPr>
-          <p:nvPr>
-            <p:ph type="ctrTitle"/>
-          </p:nvPr>
-        </p:nvSpPr>
-        <p:spPr>
-          <a:xfrm>
-            <a:off x="2419443" y="315286"/>
-            <a:ext cx="6815669" cy="1515533"/>
-          </a:xfrm>
-        </p:spPr>
-        <p:txBody>
-          <a:bodyPr>
-            <a:normAutofit/>
-          </a:bodyPr>
-          <a:lstStyle/>
-          <a:p>
-            <a:pPr algn="ctr"/>
-            <a:r>
-              <a:rPr lang="en-US" sz="5400" dirty="0" smtClean="0"/>
-              <a:t>Roadmap</a:t>
-            </a:r>
-            <a:endParaRPr lang="en-US" sz="5400" dirty="0"/>
+            <a:endParaRPr lang="en-US"/>
           </a:p>
         </p:txBody>
       </p:sp>
@@ -6322,10 +6249,36 @@
           <a:noFill/>
         </p:spPr>
       </p:pic>
+      <p:pic>
+        <p:nvPicPr>
+          <p:cNvPr id="1026" name="Picture 2" descr="C:\Users\i7\Desktop\tables.PNG"/>
+          <p:cNvPicPr>
+            <a:picLocks noChangeAspect="1" noChangeArrowheads="1"/>
+          </p:cNvPicPr>
+          <p:nvPr/>
+        </p:nvPicPr>
+        <p:blipFill>
+          <a:blip r:embed="rId3" cstate="print"/>
+          <a:srcRect/>
+          <a:stretch>
+            <a:fillRect/>
+          </a:stretch>
+        </p:blipFill>
+        <p:spPr bwMode="auto">
+          <a:xfrm>
+            <a:off x="0" y="1458686"/>
+            <a:ext cx="12192000" cy="5399314"/>
+          </a:xfrm>
+          <a:prstGeom prst="rect">
+            <a:avLst/>
+          </a:prstGeom>
+          <a:noFill/>
+        </p:spPr>
+      </p:pic>
     </p:spTree>
     <p:extLst>
       <p:ext uri="{BB962C8B-B14F-4D97-AF65-F5344CB8AC3E}">
-        <p14:creationId xmlns="" xmlns:p14="http://schemas.microsoft.com/office/powerpoint/2010/main" val="1075187792"/>
+        <p14:creationId xmlns:p14="http://schemas.microsoft.com/office/powerpoint/2010/main" xmlns="" val="1075187792"/>
       </p:ext>
     </p:extLst>
   </p:cSld>
@@ -6359,39 +6312,9 @@
           <a:chExt cx="0" cy="0"/>
         </a:xfrm>
       </p:grpSpPr>
-      <p:sp>
-        <p:nvSpPr>
-          <p:cNvPr id="2" name="Title 1"/>
-          <p:cNvSpPr>
-            <a:spLocks noGrp="1"/>
-          </p:cNvSpPr>
-          <p:nvPr>
-            <p:ph type="ctrTitle"/>
-          </p:nvPr>
-        </p:nvSpPr>
-        <p:spPr>
-          <a:xfrm>
-            <a:off x="2745701" y="2890593"/>
-            <a:ext cx="6815669" cy="1515533"/>
-          </a:xfrm>
-        </p:spPr>
-        <p:txBody>
-          <a:bodyPr>
-            <a:normAutofit/>
-          </a:bodyPr>
-          <a:lstStyle/>
-          <a:p>
-            <a:r>
-              <a:rPr lang="en-US" sz="8800" dirty="0" smtClean="0"/>
-              <a:t>THANK YOU</a:t>
-            </a:r>
-            <a:endParaRPr lang="en-US" sz="8800" dirty="0"/>
-          </a:p>
-        </p:txBody>
-      </p:sp>
       <p:pic>
         <p:nvPicPr>
-          <p:cNvPr id="3" name="Picture 3" descr="C:\Users\i7\Downloads\paloska GTC.jpg"/>
+          <p:cNvPr id="4" name="Picture 3" descr="C:\Users\i7\Downloads\paloska GTC.jpg"/>
           <p:cNvPicPr>
             <a:picLocks noChangeAspect="1" noChangeArrowheads="1"/>
           </p:cNvPicPr>
@@ -6415,10 +6338,390 @@
           <a:noFill/>
         </p:spPr>
       </p:pic>
+      <p:pic>
+        <p:nvPicPr>
+          <p:cNvPr id="3074" name="Picture 2" descr="C:\Users\i7\Desktop\editProfile.PNG"/>
+          <p:cNvPicPr>
+            <a:picLocks noChangeAspect="1" noChangeArrowheads="1"/>
+          </p:cNvPicPr>
+          <p:nvPr/>
+        </p:nvPicPr>
+        <p:blipFill>
+          <a:blip r:embed="rId3" cstate="print"/>
+          <a:srcRect/>
+          <a:stretch>
+            <a:fillRect/>
+          </a:stretch>
+        </p:blipFill>
+        <p:spPr bwMode="auto">
+          <a:xfrm>
+            <a:off x="0" y="687646"/>
+            <a:ext cx="12192000" cy="6170354"/>
+          </a:xfrm>
+          <a:prstGeom prst="rect">
+            <a:avLst/>
+          </a:prstGeom>
+          <a:noFill/>
+        </p:spPr>
+      </p:pic>
     </p:spTree>
     <p:extLst>
       <p:ext uri="{BB962C8B-B14F-4D97-AF65-F5344CB8AC3E}">
-        <p14:creationId xmlns="" xmlns:p14="http://schemas.microsoft.com/office/powerpoint/2010/main" val="3678385546"/>
+        <p14:creationId xmlns:p14="http://schemas.microsoft.com/office/powerpoint/2010/main" xmlns="" val="1075187792"/>
+      </p:ext>
+    </p:extLst>
+  </p:cSld>
+  <p:clrMapOvr>
+    <a:masterClrMapping/>
+  </p:clrMapOvr>
+  <p:timing>
+    <p:tnLst>
+      <p:par>
+        <p:cTn id="1" dur="indefinite" restart="never" nodeType="tmRoot"/>
+      </p:par>
+    </p:tnLst>
+  </p:timing>
+</p:sld>
+</file>
+
+<file path=ppt/slides/slide12.xml><?xml version="1.0" encoding="utf-8"?>
+<p:sld xmlns:a="http://schemas.openxmlformats.org/drawingml/2006/main" xmlns:r="http://schemas.openxmlformats.org/officeDocument/2006/relationships" xmlns:p="http://schemas.openxmlformats.org/presentationml/2006/main">
+  <p:cSld>
+    <p:spTree>
+      <p:nvGrpSpPr>
+        <p:cNvPr id="1" name=""/>
+        <p:cNvGrpSpPr/>
+        <p:nvPr/>
+      </p:nvGrpSpPr>
+      <p:grpSpPr>
+        <a:xfrm>
+          <a:off x="0" y="0"/>
+          <a:ext cx="0" cy="0"/>
+          <a:chOff x="0" y="0"/>
+          <a:chExt cx="0" cy="0"/>
+        </a:xfrm>
+      </p:grpSpPr>
+      <p:sp>
+        <p:nvSpPr>
+          <p:cNvPr id="5" name="Подзаголовок 4"/>
+          <p:cNvSpPr>
+            <a:spLocks noGrp="1"/>
+          </p:cNvSpPr>
+          <p:nvPr>
+            <p:ph type="subTitle" idx="1"/>
+          </p:nvPr>
+        </p:nvSpPr>
+        <p:spPr/>
+        <p:txBody>
+          <a:bodyPr/>
+          <a:lstStyle/>
+          <a:p>
+            <a:endParaRPr lang="en-US"/>
+          </a:p>
+        </p:txBody>
+      </p:sp>
+      <p:pic>
+        <p:nvPicPr>
+          <p:cNvPr id="4" name="Picture 3" descr="C:\Users\i7\Downloads\paloska GTC.jpg"/>
+          <p:cNvPicPr>
+            <a:picLocks noChangeAspect="1" noChangeArrowheads="1"/>
+          </p:cNvPicPr>
+          <p:nvPr/>
+        </p:nvPicPr>
+        <p:blipFill>
+          <a:blip r:embed="rId2" cstate="print"/>
+          <a:srcRect/>
+          <a:stretch>
+            <a:fillRect/>
+          </a:stretch>
+        </p:blipFill>
+        <p:spPr bwMode="auto">
+          <a:xfrm>
+            <a:off x="0" y="0"/>
+            <a:ext cx="12192000" cy="738187"/>
+          </a:xfrm>
+          <a:prstGeom prst="rect">
+            <a:avLst/>
+          </a:prstGeom>
+          <a:noFill/>
+        </p:spPr>
+      </p:pic>
+      <p:pic>
+        <p:nvPicPr>
+          <p:cNvPr id="2050" name="Picture 2" descr="C:\Users\i7\Desktop\mainPom.PNG"/>
+          <p:cNvPicPr>
+            <a:picLocks noChangeAspect="1" noChangeArrowheads="1"/>
+          </p:cNvPicPr>
+          <p:nvPr/>
+        </p:nvPicPr>
+        <p:blipFill>
+          <a:blip r:embed="rId3" cstate="print"/>
+          <a:srcRect/>
+          <a:stretch>
+            <a:fillRect/>
+          </a:stretch>
+        </p:blipFill>
+        <p:spPr bwMode="auto">
+          <a:xfrm>
+            <a:off x="0" y="592152"/>
+            <a:ext cx="12192000" cy="6265848"/>
+          </a:xfrm>
+          <a:prstGeom prst="rect">
+            <a:avLst/>
+          </a:prstGeom>
+          <a:noFill/>
+        </p:spPr>
+      </p:pic>
+    </p:spTree>
+    <p:extLst>
+      <p:ext uri="{BB962C8B-B14F-4D97-AF65-F5344CB8AC3E}">
+        <p14:creationId xmlns:p14="http://schemas.microsoft.com/office/powerpoint/2010/main" xmlns="" val="1075187792"/>
+      </p:ext>
+    </p:extLst>
+  </p:cSld>
+  <p:clrMapOvr>
+    <a:masterClrMapping/>
+  </p:clrMapOvr>
+  <p:timing>
+    <p:tnLst>
+      <p:par>
+        <p:cTn id="1" dur="indefinite" restart="never" nodeType="tmRoot"/>
+      </p:par>
+    </p:tnLst>
+  </p:timing>
+</p:sld>
+</file>
+
+<file path=ppt/slides/slide13.xml><?xml version="1.0" encoding="utf-8"?>
+<p:sld xmlns:a="http://schemas.openxmlformats.org/drawingml/2006/main" xmlns:r="http://schemas.openxmlformats.org/officeDocument/2006/relationships" xmlns:p="http://schemas.openxmlformats.org/presentationml/2006/main">
+  <p:cSld>
+    <p:spTree>
+      <p:nvGrpSpPr>
+        <p:cNvPr id="1" name=""/>
+        <p:cNvGrpSpPr/>
+        <p:nvPr/>
+      </p:nvGrpSpPr>
+      <p:grpSpPr>
+        <a:xfrm>
+          <a:off x="0" y="0"/>
+          <a:ext cx="0" cy="0"/>
+          <a:chOff x="0" y="0"/>
+          <a:chExt cx="0" cy="0"/>
+        </a:xfrm>
+      </p:grpSpPr>
+      <p:sp>
+        <p:nvSpPr>
+          <p:cNvPr id="3" name="Subtitle 2"/>
+          <p:cNvSpPr>
+            <a:spLocks noGrp="1"/>
+          </p:cNvSpPr>
+          <p:nvPr>
+            <p:ph type="subTitle" idx="1"/>
+          </p:nvPr>
+        </p:nvSpPr>
+        <p:spPr>
+          <a:xfrm>
+            <a:off x="1742968" y="3119564"/>
+            <a:ext cx="8825658" cy="2046500"/>
+          </a:xfrm>
+        </p:spPr>
+        <p:txBody>
+          <a:bodyPr/>
+          <a:lstStyle/>
+          <a:p>
+            <a:r>
+              <a:rPr lang="en-US" dirty="0" smtClean="0"/>
+              <a:t>Book rating</a:t>
+            </a:r>
+          </a:p>
+          <a:p>
+            <a:r>
+              <a:rPr lang="en-US" dirty="0"/>
+              <a:t>Teaching video library</a:t>
+            </a:r>
+          </a:p>
+          <a:p>
+            <a:r>
+              <a:rPr lang="en-US" dirty="0" err="1" smtClean="0"/>
+              <a:t>Chating</a:t>
+            </a:r>
+            <a:endParaRPr lang="en-US" dirty="0" smtClean="0"/>
+          </a:p>
+          <a:p>
+            <a:r>
+              <a:rPr lang="en-US" dirty="0" err="1" smtClean="0"/>
+              <a:t>jenkins</a:t>
+            </a:r>
+            <a:r>
+              <a:rPr lang="en-US" dirty="0" smtClean="0"/>
+              <a:t> integration</a:t>
+            </a:r>
+          </a:p>
+          <a:p>
+            <a:endParaRPr lang="en-US" dirty="0" smtClean="0"/>
+          </a:p>
+          <a:p>
+            <a:endParaRPr lang="en-US" dirty="0" smtClean="0"/>
+          </a:p>
+          <a:p>
+            <a:endParaRPr lang="en-US" dirty="0"/>
+          </a:p>
+        </p:txBody>
+      </p:sp>
+      <p:sp>
+        <p:nvSpPr>
+          <p:cNvPr id="2" name="Title 1"/>
+          <p:cNvSpPr>
+            <a:spLocks noGrp="1"/>
+          </p:cNvSpPr>
+          <p:nvPr>
+            <p:ph type="ctrTitle"/>
+          </p:nvPr>
+        </p:nvSpPr>
+        <p:spPr>
+          <a:xfrm>
+            <a:off x="2419443" y="315286"/>
+            <a:ext cx="6815669" cy="1515533"/>
+          </a:xfrm>
+        </p:spPr>
+        <p:txBody>
+          <a:bodyPr>
+            <a:normAutofit/>
+          </a:bodyPr>
+          <a:lstStyle/>
+          <a:p>
+            <a:pPr algn="ctr"/>
+            <a:r>
+              <a:rPr lang="en-US" sz="5400" dirty="0" smtClean="0"/>
+              <a:t>Roadmap</a:t>
+            </a:r>
+            <a:endParaRPr lang="en-US" sz="5400" dirty="0"/>
+          </a:p>
+        </p:txBody>
+      </p:sp>
+      <p:pic>
+        <p:nvPicPr>
+          <p:cNvPr id="4" name="Picture 3" descr="C:\Users\i7\Downloads\paloska GTC.jpg"/>
+          <p:cNvPicPr>
+            <a:picLocks noChangeAspect="1" noChangeArrowheads="1"/>
+          </p:cNvPicPr>
+          <p:nvPr/>
+        </p:nvPicPr>
+        <p:blipFill>
+          <a:blip r:embed="rId2" cstate="print"/>
+          <a:srcRect/>
+          <a:stretch>
+            <a:fillRect/>
+          </a:stretch>
+        </p:blipFill>
+        <p:spPr bwMode="auto">
+          <a:xfrm>
+            <a:off x="0" y="0"/>
+            <a:ext cx="12192000" cy="738187"/>
+          </a:xfrm>
+          <a:prstGeom prst="rect">
+            <a:avLst/>
+          </a:prstGeom>
+          <a:noFill/>
+        </p:spPr>
+      </p:pic>
+    </p:spTree>
+    <p:extLst>
+      <p:ext uri="{BB962C8B-B14F-4D97-AF65-F5344CB8AC3E}">
+        <p14:creationId xmlns:p14="http://schemas.microsoft.com/office/powerpoint/2010/main" xmlns="" val="1075187792"/>
+      </p:ext>
+    </p:extLst>
+  </p:cSld>
+  <p:clrMapOvr>
+    <a:masterClrMapping/>
+  </p:clrMapOvr>
+  <p:timing>
+    <p:tnLst>
+      <p:par>
+        <p:cTn id="1" dur="indefinite" restart="never" nodeType="tmRoot"/>
+      </p:par>
+    </p:tnLst>
+  </p:timing>
+</p:sld>
+</file>
+
+<file path=ppt/slides/slide14.xml><?xml version="1.0" encoding="utf-8"?>
+<p:sld xmlns:a="http://schemas.openxmlformats.org/drawingml/2006/main" xmlns:r="http://schemas.openxmlformats.org/officeDocument/2006/relationships" xmlns:p="http://schemas.openxmlformats.org/presentationml/2006/main">
+  <p:cSld>
+    <p:spTree>
+      <p:nvGrpSpPr>
+        <p:cNvPr id="1" name=""/>
+        <p:cNvGrpSpPr/>
+        <p:nvPr/>
+      </p:nvGrpSpPr>
+      <p:grpSpPr>
+        <a:xfrm>
+          <a:off x="0" y="0"/>
+          <a:ext cx="0" cy="0"/>
+          <a:chOff x="0" y="0"/>
+          <a:chExt cx="0" cy="0"/>
+        </a:xfrm>
+      </p:grpSpPr>
+      <p:sp>
+        <p:nvSpPr>
+          <p:cNvPr id="2" name="Title 1"/>
+          <p:cNvSpPr>
+            <a:spLocks noGrp="1"/>
+          </p:cNvSpPr>
+          <p:nvPr>
+            <p:ph type="ctrTitle"/>
+          </p:nvPr>
+        </p:nvSpPr>
+        <p:spPr>
+          <a:xfrm>
+            <a:off x="2745701" y="2890593"/>
+            <a:ext cx="6815669" cy="1515533"/>
+          </a:xfrm>
+        </p:spPr>
+        <p:txBody>
+          <a:bodyPr>
+            <a:normAutofit/>
+          </a:bodyPr>
+          <a:lstStyle/>
+          <a:p>
+            <a:r>
+              <a:rPr lang="en-US" sz="8800" dirty="0" smtClean="0"/>
+              <a:t>THANK YOU</a:t>
+            </a:r>
+            <a:endParaRPr lang="en-US" sz="8800" dirty="0"/>
+          </a:p>
+        </p:txBody>
+      </p:sp>
+      <p:pic>
+        <p:nvPicPr>
+          <p:cNvPr id="3" name="Picture 3" descr="C:\Users\i7\Downloads\paloska GTC.jpg"/>
+          <p:cNvPicPr>
+            <a:picLocks noChangeAspect="1" noChangeArrowheads="1"/>
+          </p:cNvPicPr>
+          <p:nvPr/>
+        </p:nvPicPr>
+        <p:blipFill>
+          <a:blip r:embed="rId2" cstate="print"/>
+          <a:srcRect/>
+          <a:stretch>
+            <a:fillRect/>
+          </a:stretch>
+        </p:blipFill>
+        <p:spPr bwMode="auto">
+          <a:xfrm>
+            <a:off x="0" y="0"/>
+            <a:ext cx="12192000" cy="738187"/>
+          </a:xfrm>
+          <a:prstGeom prst="rect">
+            <a:avLst/>
+          </a:prstGeom>
+          <a:noFill/>
+        </p:spPr>
+      </p:pic>
+    </p:spTree>
+    <p:extLst>
+      <p:ext uri="{BB962C8B-B14F-4D97-AF65-F5344CB8AC3E}">
+        <p14:creationId xmlns:p14="http://schemas.microsoft.com/office/powerpoint/2010/main" xmlns="" val="3678385546"/>
       </p:ext>
     </p:extLst>
   </p:cSld>
@@ -6653,7 +6956,7 @@
     </p:spTree>
     <p:extLst>
       <p:ext uri="{BB962C8B-B14F-4D97-AF65-F5344CB8AC3E}">
-        <p14:creationId xmlns="" xmlns:p14="http://schemas.microsoft.com/office/powerpoint/2010/main" val="443230944"/>
+        <p14:creationId xmlns:p14="http://schemas.microsoft.com/office/powerpoint/2010/main" xmlns="" val="443230944"/>
       </p:ext>
     </p:extLst>
   </p:cSld>
@@ -6806,7 +7109,7 @@
     </p:spTree>
     <p:extLst>
       <p:ext uri="{BB962C8B-B14F-4D97-AF65-F5344CB8AC3E}">
-        <p14:creationId xmlns="" xmlns:p14="http://schemas.microsoft.com/office/powerpoint/2010/main" val="916197228"/>
+        <p14:creationId xmlns:p14="http://schemas.microsoft.com/office/powerpoint/2010/main" xmlns="" val="916197228"/>
       </p:ext>
     </p:extLst>
   </p:cSld>
@@ -7038,7 +7341,7 @@
     </p:spTree>
     <p:extLst>
       <p:ext uri="{BB962C8B-B14F-4D97-AF65-F5344CB8AC3E}">
-        <p14:creationId xmlns="" xmlns:p14="http://schemas.microsoft.com/office/powerpoint/2010/main" val="1782030088"/>
+        <p14:creationId xmlns:p14="http://schemas.microsoft.com/office/powerpoint/2010/main" xmlns="" val="1782030088"/>
       </p:ext>
     </p:extLst>
   </p:cSld>
@@ -7215,7 +7518,7 @@
     </p:spTree>
     <p:extLst>
       <p:ext uri="{BB962C8B-B14F-4D97-AF65-F5344CB8AC3E}">
-        <p14:creationId xmlns="" xmlns:p14="http://schemas.microsoft.com/office/powerpoint/2010/main" val="366920874"/>
+        <p14:creationId xmlns:p14="http://schemas.microsoft.com/office/powerpoint/2010/main" xmlns="" val="366920874"/>
       </p:ext>
     </p:extLst>
   </p:cSld>
@@ -7342,7 +7645,7 @@
     </p:spTree>
     <p:extLst>
       <p:ext uri="{BB962C8B-B14F-4D97-AF65-F5344CB8AC3E}">
-        <p14:creationId xmlns="" xmlns:p14="http://schemas.microsoft.com/office/powerpoint/2010/main" val="1075187792"/>
+        <p14:creationId xmlns:p14="http://schemas.microsoft.com/office/powerpoint/2010/main" xmlns="" val="1075187792"/>
       </p:ext>
     </p:extLst>
   </p:cSld>
@@ -7528,7 +7831,7 @@
     </p:spTree>
     <p:extLst>
       <p:ext uri="{BB962C8B-B14F-4D97-AF65-F5344CB8AC3E}">
-        <p14:creationId xmlns="" xmlns:p14="http://schemas.microsoft.com/office/powerpoint/2010/main" val="1075187792"/>
+        <p14:creationId xmlns:p14="http://schemas.microsoft.com/office/powerpoint/2010/main" xmlns="" val="1075187792"/>
       </p:ext>
     </p:extLst>
   </p:cSld>
@@ -7714,7 +8017,7 @@
     </p:spTree>
     <p:extLst>
       <p:ext uri="{BB962C8B-B14F-4D97-AF65-F5344CB8AC3E}">
-        <p14:creationId xmlns="" xmlns:p14="http://schemas.microsoft.com/office/powerpoint/2010/main" val="1075187792"/>
+        <p14:creationId xmlns:p14="http://schemas.microsoft.com/office/powerpoint/2010/main" xmlns="" val="1075187792"/>
       </p:ext>
     </p:extLst>
   </p:cSld>
@@ -7847,7 +8150,7 @@
     </p:spTree>
     <p:extLst>
       <p:ext uri="{BB962C8B-B14F-4D97-AF65-F5344CB8AC3E}">
-        <p14:creationId xmlns="" xmlns:p14="http://schemas.microsoft.com/office/powerpoint/2010/main" val="1075187792"/>
+        <p14:creationId xmlns:p14="http://schemas.microsoft.com/office/powerpoint/2010/main" xmlns="" val="1075187792"/>
       </p:ext>
     </p:extLst>
   </p:cSld>

</xml_diff>